<commit_message>
admin/github: update setup instructions
</commit_message>
<xml_diff>
--- a/diagrams/admin/prDetails.pptx
+++ b/diagrams/admin/prDetails.pptx
@@ -244,7 +244,7 @@
           <a:p>
             <a:fld id="{4FC1DA0B-BD55-491A-954C-C130A5C3AFD8}" type="datetimeFigureOut">
               <a:rPr lang="en-US" smtClean="0"/>
-              <a:t>2017-12-28</a:t>
+              <a:t>29-Aug-18</a:t>
             </a:fld>
             <a:endParaRPr lang="en-US"/>
           </a:p>
@@ -414,7 +414,7 @@
           <a:p>
             <a:fld id="{4FC1DA0B-BD55-491A-954C-C130A5C3AFD8}" type="datetimeFigureOut">
               <a:rPr lang="en-US" smtClean="0"/>
-              <a:t>2017-12-28</a:t>
+              <a:t>29-Aug-18</a:t>
             </a:fld>
             <a:endParaRPr lang="en-US"/>
           </a:p>
@@ -594,7 +594,7 @@
           <a:p>
             <a:fld id="{4FC1DA0B-BD55-491A-954C-C130A5C3AFD8}" type="datetimeFigureOut">
               <a:rPr lang="en-US" smtClean="0"/>
-              <a:t>2017-12-28</a:t>
+              <a:t>29-Aug-18</a:t>
             </a:fld>
             <a:endParaRPr lang="en-US"/>
           </a:p>
@@ -843,7 +843,7 @@
                 </a:solidFill>
               </a:rPr>
               <a:pPr/>
-              <a:t>2017-12-28</a:t>
+              <a:t>29-Aug-18</a:t>
             </a:fld>
             <a:endParaRPr lang="en-US">
               <a:solidFill>
@@ -1045,7 +1045,7 @@
                 </a:solidFill>
               </a:rPr>
               <a:pPr/>
-              <a:t>2017-12-28</a:t>
+              <a:t>29-Aug-18</a:t>
             </a:fld>
             <a:endParaRPr lang="en-US">
               <a:solidFill>
@@ -1323,7 +1323,7 @@
                 </a:solidFill>
               </a:rPr>
               <a:pPr/>
-              <a:t>2017-12-28</a:t>
+              <a:t>29-Aug-18</a:t>
             </a:fld>
             <a:endParaRPr lang="en-US">
               <a:solidFill>
@@ -1643,7 +1643,7 @@
                 </a:solidFill>
               </a:rPr>
               <a:pPr/>
-              <a:t>2017-12-28</a:t>
+              <a:t>29-Aug-18</a:t>
             </a:fld>
             <a:endParaRPr lang="en-US">
               <a:solidFill>
@@ -2097,7 +2097,7 @@
                 </a:solidFill>
               </a:rPr>
               <a:pPr/>
-              <a:t>2017-12-28</a:t>
+              <a:t>29-Aug-18</a:t>
             </a:fld>
             <a:endParaRPr lang="en-US">
               <a:solidFill>
@@ -2247,7 +2247,7 @@
                 </a:solidFill>
               </a:rPr>
               <a:pPr/>
-              <a:t>2017-12-28</a:t>
+              <a:t>29-Aug-18</a:t>
             </a:fld>
             <a:endParaRPr lang="en-US">
               <a:solidFill>
@@ -2374,7 +2374,7 @@
                 </a:solidFill>
               </a:rPr>
               <a:pPr/>
-              <a:t>2017-12-28</a:t>
+              <a:t>29-Aug-18</a:t>
             </a:fld>
             <a:endParaRPr lang="en-US">
               <a:solidFill>
@@ -2683,7 +2683,7 @@
                 </a:solidFill>
               </a:rPr>
               <a:pPr/>
-              <a:t>2017-12-28</a:t>
+              <a:t>29-Aug-18</a:t>
             </a:fld>
             <a:endParaRPr lang="en-US">
               <a:solidFill>
@@ -2878,7 +2878,7 @@
           <a:p>
             <a:fld id="{4FC1DA0B-BD55-491A-954C-C130A5C3AFD8}" type="datetimeFigureOut">
               <a:rPr lang="en-US" smtClean="0"/>
-              <a:t>2017-12-28</a:t>
+              <a:t>29-Aug-18</a:t>
             </a:fld>
             <a:endParaRPr lang="en-US"/>
           </a:p>
@@ -3138,7 +3138,7 @@
                 </a:solidFill>
               </a:rPr>
               <a:pPr/>
-              <a:t>2017-12-28</a:t>
+              <a:t>29-Aug-18</a:t>
             </a:fld>
             <a:endParaRPr lang="en-US">
               <a:solidFill>
@@ -3340,7 +3340,7 @@
                 </a:solidFill>
               </a:rPr>
               <a:pPr/>
-              <a:t>2017-12-28</a:t>
+              <a:t>29-Aug-18</a:t>
             </a:fld>
             <a:endParaRPr lang="en-US">
               <a:solidFill>
@@ -3552,7 +3552,7 @@
                 </a:solidFill>
               </a:rPr>
               <a:pPr/>
-              <a:t>2017-12-28</a:t>
+              <a:t>29-Aug-18</a:t>
             </a:fld>
             <a:endParaRPr lang="en-US">
               <a:solidFill>
@@ -3823,7 +3823,7 @@
           <a:p>
             <a:fld id="{4FC1DA0B-BD55-491A-954C-C130A5C3AFD8}" type="datetimeFigureOut">
               <a:rPr lang="en-US" smtClean="0"/>
-              <a:t>2017-12-28</a:t>
+              <a:t>29-Aug-18</a:t>
             </a:fld>
             <a:endParaRPr lang="en-US"/>
           </a:p>
@@ -4055,7 +4055,7 @@
           <a:p>
             <a:fld id="{4FC1DA0B-BD55-491A-954C-C130A5C3AFD8}" type="datetimeFigureOut">
               <a:rPr lang="en-US" smtClean="0"/>
-              <a:t>2017-12-28</a:t>
+              <a:t>29-Aug-18</a:t>
             </a:fld>
             <a:endParaRPr lang="en-US"/>
           </a:p>
@@ -4422,7 +4422,7 @@
           <a:p>
             <a:fld id="{4FC1DA0B-BD55-491A-954C-C130A5C3AFD8}" type="datetimeFigureOut">
               <a:rPr lang="en-US" smtClean="0"/>
-              <a:t>2017-12-28</a:t>
+              <a:t>29-Aug-18</a:t>
             </a:fld>
             <a:endParaRPr lang="en-US"/>
           </a:p>
@@ -4540,7 +4540,7 @@
           <a:p>
             <a:fld id="{4FC1DA0B-BD55-491A-954C-C130A5C3AFD8}" type="datetimeFigureOut">
               <a:rPr lang="en-US" smtClean="0"/>
-              <a:t>2017-12-28</a:t>
+              <a:t>29-Aug-18</a:t>
             </a:fld>
             <a:endParaRPr lang="en-US"/>
           </a:p>
@@ -4635,7 +4635,7 @@
           <a:p>
             <a:fld id="{4FC1DA0B-BD55-491A-954C-C130A5C3AFD8}" type="datetimeFigureOut">
               <a:rPr lang="en-US" smtClean="0"/>
-              <a:t>2017-12-28</a:t>
+              <a:t>29-Aug-18</a:t>
             </a:fld>
             <a:endParaRPr lang="en-US"/>
           </a:p>
@@ -4912,7 +4912,7 @@
           <a:p>
             <a:fld id="{4FC1DA0B-BD55-491A-954C-C130A5C3AFD8}" type="datetimeFigureOut">
               <a:rPr lang="en-US" smtClean="0"/>
-              <a:t>2017-12-28</a:t>
+              <a:t>29-Aug-18</a:t>
             </a:fld>
             <a:endParaRPr lang="en-US"/>
           </a:p>
@@ -5165,7 +5165,7 @@
           <a:p>
             <a:fld id="{4FC1DA0B-BD55-491A-954C-C130A5C3AFD8}" type="datetimeFigureOut">
               <a:rPr lang="en-US" smtClean="0"/>
-              <a:t>2017-12-28</a:t>
+              <a:t>29-Aug-18</a:t>
             </a:fld>
             <a:endParaRPr lang="en-US"/>
           </a:p>
@@ -5378,7 +5378,7 @@
           <a:p>
             <a:fld id="{4FC1DA0B-BD55-491A-954C-C130A5C3AFD8}" type="datetimeFigureOut">
               <a:rPr lang="en-US" smtClean="0"/>
-              <a:t>2017-12-28</a:t>
+              <a:t>29-Aug-18</a:t>
             </a:fld>
             <a:endParaRPr lang="en-US"/>
           </a:p>
@@ -5925,7 +5925,7 @@
                 </a:solidFill>
               </a:rPr>
               <a:pPr/>
-              <a:t>2017-12-28</a:t>
+              <a:t>29-Aug-18</a:t>
             </a:fld>
             <a:endParaRPr lang="en-US">
               <a:solidFill>
@@ -6436,7 +6436,7 @@
         <p:spPr>
           <a:xfrm>
             <a:off x="5304972" y="2358570"/>
-            <a:ext cx="2685143" cy="522516"/>
+            <a:ext cx="3061194" cy="522516"/>
           </a:xfrm>
           <a:prstGeom prst="wedgeRoundRectCallout">
             <a:avLst>
@@ -6513,7 +6513,7 @@
                 </a:solidFill>
                 <a:latin typeface="Consolas" panose="020B0609020204030204" pitchFamily="49" charset="0"/>
               </a:rPr>
-              <a:t>johnk</a:t>
+              <a:t>your_github_username</a:t>
             </a:r>
             <a:r>
               <a:rPr lang="en-US" sz="1200" dirty="0" smtClean="0">
@@ -6522,7 +6522,16 @@
                 </a:solidFill>
                 <a:latin typeface="Consolas" panose="020B0609020204030204" pitchFamily="49" charset="0"/>
               </a:rPr>
-              <a:t>/addressbook-level1</a:t>
+              <a:t>/</a:t>
+            </a:r>
+            <a:r>
+              <a:rPr lang="en-US" sz="1200" dirty="0" err="1" smtClean="0">
+                <a:solidFill>
+                  <a:schemeClr val="tx1"/>
+                </a:solidFill>
+                <a:latin typeface="Consolas" panose="020B0609020204030204" pitchFamily="49" charset="0"/>
+              </a:rPr>
+              <a:t>repo_name</a:t>
             </a:r>
             <a:endParaRPr lang="en-US" sz="1200" dirty="0">
               <a:solidFill>
@@ -6626,8 +6635,8 @@
           </a:xfrm>
           <a:prstGeom prst="wedgeRoundRectCallout">
             <a:avLst>
-              <a:gd name="adj1" fmla="val -14953"/>
-              <a:gd name="adj2" fmla="val 115079"/>
+              <a:gd name="adj1" fmla="val -16915"/>
+              <a:gd name="adj2" fmla="val 111433"/>
               <a:gd name="adj3" fmla="val 16667"/>
             </a:avLst>
           </a:prstGeom>
@@ -6691,7 +6700,16 @@
                 </a:solidFill>
                 <a:latin typeface="Consolas" panose="020B0609020204030204" pitchFamily="49" charset="0"/>
               </a:rPr>
-              <a:t>nus-cs2103-AY1718S2/addressbook-level1</a:t>
+              <a:t>nus-cs2103-AY1718S2/</a:t>
+            </a:r>
+            <a:r>
+              <a:rPr lang="en-US" sz="1200" dirty="0" err="1" smtClean="0">
+                <a:solidFill>
+                  <a:schemeClr val="tx1"/>
+                </a:solidFill>
+                <a:latin typeface="Consolas" panose="020B0609020204030204" pitchFamily="49" charset="0"/>
+              </a:rPr>
+              <a:t>repo_name</a:t>
             </a:r>
             <a:endParaRPr lang="en-US" sz="1200" dirty="0">
               <a:solidFill>
@@ -6699,6 +6717,194 @@
               </a:solidFill>
               <a:latin typeface="Consolas" panose="020B0609020204030204" pitchFamily="49" charset="0"/>
             </a:endParaRPr>
+          </a:p>
+        </p:txBody>
+      </p:sp>
+      <p:sp>
+        <p:nvSpPr>
+          <p:cNvPr id="5" name="Rectangle 4"/>
+          <p:cNvSpPr/>
+          <p:nvPr/>
+        </p:nvSpPr>
+        <p:spPr>
+          <a:xfrm>
+            <a:off x="2576945" y="2637641"/>
+            <a:ext cx="475013" cy="141186"/>
+          </a:xfrm>
+          <a:prstGeom prst="rect">
+            <a:avLst/>
+          </a:prstGeom>
+          <a:solidFill>
+            <a:srgbClr val="7030A0"/>
+          </a:solidFill>
+          <a:ln>
+            <a:noFill/>
+          </a:ln>
+        </p:spPr>
+        <p:style>
+          <a:lnRef idx="2">
+            <a:schemeClr val="accent1">
+              <a:shade val="50000"/>
+            </a:schemeClr>
+          </a:lnRef>
+          <a:fillRef idx="1">
+            <a:schemeClr val="accent1"/>
+          </a:fillRef>
+          <a:effectRef idx="0">
+            <a:schemeClr val="accent1"/>
+          </a:effectRef>
+          <a:fontRef idx="minor">
+            <a:schemeClr val="lt1"/>
+          </a:fontRef>
+        </p:style>
+        <p:txBody>
+          <a:bodyPr rtlCol="0" anchor="ctr"/>
+          <a:lstStyle/>
+          <a:p>
+            <a:pPr algn="ctr"/>
+            <a:endParaRPr lang="en-US"/>
+          </a:p>
+        </p:txBody>
+      </p:sp>
+      <p:sp>
+        <p:nvSpPr>
+          <p:cNvPr id="12" name="Rectangle 11"/>
+          <p:cNvSpPr/>
+          <p:nvPr/>
+        </p:nvSpPr>
+        <p:spPr>
+          <a:xfrm>
+            <a:off x="3159497" y="2637641"/>
+            <a:ext cx="664358" cy="141186"/>
+          </a:xfrm>
+          <a:prstGeom prst="rect">
+            <a:avLst/>
+          </a:prstGeom>
+          <a:solidFill>
+            <a:schemeClr val="accent6">
+              <a:lumMod val="75000"/>
+            </a:schemeClr>
+          </a:solidFill>
+          <a:ln>
+            <a:noFill/>
+          </a:ln>
+        </p:spPr>
+        <p:style>
+          <a:lnRef idx="2">
+            <a:schemeClr val="accent1">
+              <a:shade val="50000"/>
+            </a:schemeClr>
+          </a:lnRef>
+          <a:fillRef idx="1">
+            <a:schemeClr val="accent1"/>
+          </a:fillRef>
+          <a:effectRef idx="0">
+            <a:schemeClr val="accent1"/>
+          </a:effectRef>
+          <a:fontRef idx="minor">
+            <a:schemeClr val="lt1"/>
+          </a:fontRef>
+        </p:style>
+        <p:txBody>
+          <a:bodyPr rtlCol="0" anchor="ctr"/>
+          <a:lstStyle/>
+          <a:p>
+            <a:pPr algn="ctr"/>
+            <a:endParaRPr lang="en-US"/>
+          </a:p>
+        </p:txBody>
+      </p:sp>
+      <p:sp>
+        <p:nvSpPr>
+          <p:cNvPr id="13" name="Rectangle 12"/>
+          <p:cNvSpPr/>
+          <p:nvPr/>
+        </p:nvSpPr>
+        <p:spPr>
+          <a:xfrm>
+            <a:off x="3195124" y="3189563"/>
+            <a:ext cx="539667" cy="141186"/>
+          </a:xfrm>
+          <a:prstGeom prst="rect">
+            <a:avLst/>
+          </a:prstGeom>
+          <a:solidFill>
+            <a:schemeClr val="accent6">
+              <a:lumMod val="75000"/>
+            </a:schemeClr>
+          </a:solidFill>
+          <a:ln>
+            <a:noFill/>
+          </a:ln>
+        </p:spPr>
+        <p:style>
+          <a:lnRef idx="2">
+            <a:schemeClr val="accent1">
+              <a:shade val="50000"/>
+            </a:schemeClr>
+          </a:lnRef>
+          <a:fillRef idx="1">
+            <a:schemeClr val="accent1"/>
+          </a:fillRef>
+          <a:effectRef idx="0">
+            <a:schemeClr val="accent1"/>
+          </a:effectRef>
+          <a:fontRef idx="minor">
+            <a:schemeClr val="lt1"/>
+          </a:fontRef>
+        </p:style>
+        <p:txBody>
+          <a:bodyPr rtlCol="0" anchor="ctr"/>
+          <a:lstStyle/>
+          <a:p>
+            <a:pPr algn="ctr"/>
+            <a:endParaRPr lang="en-US"/>
+          </a:p>
+        </p:txBody>
+      </p:sp>
+      <p:sp>
+        <p:nvSpPr>
+          <p:cNvPr id="14" name="Rectangle 13"/>
+          <p:cNvSpPr/>
+          <p:nvPr/>
+        </p:nvSpPr>
+        <p:spPr>
+          <a:xfrm>
+            <a:off x="2772384" y="3189563"/>
+            <a:ext cx="366634" cy="141186"/>
+          </a:xfrm>
+          <a:prstGeom prst="rect">
+            <a:avLst/>
+          </a:prstGeom>
+          <a:solidFill>
+            <a:srgbClr val="7030A0"/>
+          </a:solidFill>
+          <a:ln>
+            <a:noFill/>
+          </a:ln>
+        </p:spPr>
+        <p:style>
+          <a:lnRef idx="2">
+            <a:schemeClr val="accent1">
+              <a:shade val="50000"/>
+            </a:schemeClr>
+          </a:lnRef>
+          <a:fillRef idx="1">
+            <a:schemeClr val="accent1"/>
+          </a:fillRef>
+          <a:effectRef idx="0">
+            <a:schemeClr val="accent1"/>
+          </a:effectRef>
+          <a:fontRef idx="minor">
+            <a:schemeClr val="lt1"/>
+          </a:fontRef>
+        </p:style>
+        <p:txBody>
+          <a:bodyPr rtlCol="0" anchor="ctr"/>
+          <a:lstStyle/>
+          <a:p>
+            <a:pPr algn="ctr"/>
+            <a:endParaRPr lang="en-US"/>
           </a:p>
         </p:txBody>
       </p:sp>

</xml_diff>